<commit_message>
updated typo in presentation
</commit_message>
<xml_diff>
--- a/angular-gotchas.pptx
+++ b/angular-gotchas.pptx
@@ -348,7 +348,7 @@
           <a:p>
             <a:fld id="{651A0C47-018D-4460-B945-BFF7981B6CA6}" type="datetimeFigureOut">
               <a:rPr lang="en-US" smtClean="0"/>
-              <a:t>1/12/14</a:t>
+              <a:t>1/14/14</a:t>
             </a:fld>
             <a:endParaRPr lang="en-US"/>
           </a:p>
@@ -680,7 +680,7 @@
           <a:p>
             <a:fld id="{651A0C47-018D-4460-B945-BFF7981B6CA6}" type="datetimeFigureOut">
               <a:rPr lang="en-US" smtClean="0"/>
-              <a:t>1/12/14</a:t>
+              <a:t>1/14/14</a:t>
             </a:fld>
             <a:endParaRPr lang="en-US"/>
           </a:p>
@@ -1012,7 +1012,7 @@
           <a:p>
             <a:fld id="{651A0C47-018D-4460-B945-BFF7981B6CA6}" type="datetimeFigureOut">
               <a:rPr lang="en-US" smtClean="0"/>
-              <a:t>1/12/14</a:t>
+              <a:t>1/14/14</a:t>
             </a:fld>
             <a:endParaRPr lang="en-US"/>
           </a:p>
@@ -1344,7 +1344,7 @@
           <a:p>
             <a:fld id="{651A0C47-018D-4460-B945-BFF7981B6CA6}" type="datetimeFigureOut">
               <a:rPr lang="en-US" smtClean="0"/>
-              <a:t>1/12/14</a:t>
+              <a:t>1/14/14</a:t>
             </a:fld>
             <a:endParaRPr lang="en-US"/>
           </a:p>
@@ -2033,7 +2033,7 @@
           <a:p>
             <a:fld id="{651A0C47-018D-4460-B945-BFF7981B6CA6}" type="datetimeFigureOut">
               <a:rPr lang="en-US" smtClean="0"/>
-              <a:t>1/12/14</a:t>
+              <a:t>1/14/14</a:t>
             </a:fld>
             <a:endParaRPr lang="en-US"/>
           </a:p>
@@ -2212,7 +2212,7 @@
           <a:p>
             <a:fld id="{651A0C47-018D-4460-B945-BFF7981B6CA6}" type="datetimeFigureOut">
               <a:rPr lang="en-US" smtClean="0"/>
-              <a:t>1/12/14</a:t>
+              <a:t>1/14/14</a:t>
             </a:fld>
             <a:endParaRPr lang="en-US"/>
           </a:p>
@@ -2386,7 +2386,7 @@
           <a:p>
             <a:fld id="{651A0C47-018D-4460-B945-BFF7981B6CA6}" type="datetimeFigureOut">
               <a:rPr lang="en-US" smtClean="0"/>
-              <a:t>1/12/14</a:t>
+              <a:t>1/14/14</a:t>
             </a:fld>
             <a:endParaRPr lang="en-US"/>
           </a:p>
@@ -2634,7 +2634,7 @@
           <a:p>
             <a:fld id="{651A0C47-018D-4460-B945-BFF7981B6CA6}" type="datetimeFigureOut">
               <a:rPr lang="en-US" smtClean="0"/>
-              <a:t>1/12/14</a:t>
+              <a:t>1/14/14</a:t>
             </a:fld>
             <a:endParaRPr lang="en-US"/>
           </a:p>
@@ -2964,7 +2964,7 @@
           <a:p>
             <a:fld id="{651A0C47-018D-4460-B945-BFF7981B6CA6}" type="datetimeFigureOut">
               <a:rPr lang="en-US" smtClean="0"/>
-              <a:t>1/12/14</a:t>
+              <a:t>1/14/14</a:t>
             </a:fld>
             <a:endParaRPr lang="en-US"/>
           </a:p>
@@ -3256,7 +3256,7 @@
           <a:p>
             <a:fld id="{651A0C47-018D-4460-B945-BFF7981B6CA6}" type="datetimeFigureOut">
               <a:rPr lang="en-US" smtClean="0"/>
-              <a:t>1/12/14</a:t>
+              <a:t>1/14/14</a:t>
             </a:fld>
             <a:endParaRPr lang="en-US"/>
           </a:p>
@@ -3692,7 +3692,7 @@
           <a:p>
             <a:fld id="{651A0C47-018D-4460-B945-BFF7981B6CA6}" type="datetimeFigureOut">
               <a:rPr lang="en-US" smtClean="0"/>
-              <a:t>1/12/14</a:t>
+              <a:t>1/14/14</a:t>
             </a:fld>
             <a:endParaRPr lang="en-US"/>
           </a:p>
@@ -3879,7 +3879,7 @@
           <a:p>
             <a:fld id="{651A0C47-018D-4460-B945-BFF7981B6CA6}" type="datetimeFigureOut">
               <a:rPr lang="en-US" smtClean="0"/>
-              <a:t>1/12/14</a:t>
+              <a:t>1/14/14</a:t>
             </a:fld>
             <a:endParaRPr lang="en-US"/>
           </a:p>
@@ -3969,7 +3969,7 @@
           <a:p>
             <a:fld id="{651A0C47-018D-4460-B945-BFF7981B6CA6}" type="datetimeFigureOut">
               <a:rPr lang="en-US" smtClean="0"/>
-              <a:t>1/12/14</a:t>
+              <a:t>1/14/14</a:t>
             </a:fld>
             <a:endParaRPr lang="en-US"/>
           </a:p>
@@ -4250,7 +4250,7 @@
           <a:p>
             <a:fld id="{651A0C47-018D-4460-B945-BFF7981B6CA6}" type="datetimeFigureOut">
               <a:rPr lang="en-US" smtClean="0"/>
-              <a:t>1/12/14</a:t>
+              <a:t>1/14/14</a:t>
             </a:fld>
             <a:endParaRPr lang="en-US"/>
           </a:p>
@@ -4465,7 +4465,7 @@
           <a:p>
             <a:fld id="{651A0C47-018D-4460-B945-BFF7981B6CA6}" type="datetimeFigureOut">
               <a:rPr lang="en-US" smtClean="0"/>
-              <a:t>1/12/14</a:t>
+              <a:t>1/14/14</a:t>
             </a:fld>
             <a:endParaRPr lang="en-US"/>
           </a:p>
@@ -6343,10 +6343,6 @@
               </a:rPr>
               <a:t>('15');</a:t>
             </a:r>
-            <a:endParaRPr lang="en-US" dirty="0">
-              <a:latin typeface="Courier New"/>
-              <a:cs typeface="Courier New"/>
-            </a:endParaRPr>
           </a:p>
         </p:txBody>
       </p:sp>
@@ -6606,11 +6602,11 @@
   <p:clrMapOvr>
     <a:masterClrMapping/>
   </p:clrMapOvr>
-  <mc:AlternateContent xmlns:mc="http://schemas.openxmlformats.org/markup-compatibility/2006">
-    <mc:Choice xmlns:p14="http://schemas.microsoft.com/office/powerpoint/2010/main" Requires="p14">
+  <mc:AlternateContent xmlns:mc="http://schemas.openxmlformats.org/markup-compatibility/2006" xmlns:p14="http://schemas.microsoft.com/office/powerpoint/2010/main">
+    <mc:Choice Requires="p14">
       <p:transition p14:dur="0"/>
     </mc:Choice>
-    <mc:Fallback>
+    <mc:Fallback xmlns="">
       <p:transition xmlns:p14="http://schemas.microsoft.com/office/powerpoint/2010/main"/>
     </mc:Fallback>
   </mc:AlternateContent>
@@ -7976,10 +7972,6 @@
               </a:rPr>
               <a:t>(4);</a:t>
             </a:r>
-            <a:endParaRPr lang="en-US" dirty="0">
-              <a:latin typeface="Courier New"/>
-              <a:cs typeface="Courier New"/>
-            </a:endParaRPr>
           </a:p>
         </p:txBody>
       </p:sp>
@@ -8388,10 +8380,6 @@
               </a:rPr>
               <a:t>();</a:t>
             </a:r>
-            <a:endParaRPr lang="en-US" dirty="0">
-              <a:latin typeface="Courier New"/>
-              <a:cs typeface="Courier New"/>
-            </a:endParaRPr>
           </a:p>
         </p:txBody>
       </p:sp>
@@ -9364,10 +9352,6 @@
               </a:rPr>
               <a:t>");</a:t>
             </a:r>
-            <a:endParaRPr lang="en-US" dirty="0">
-              <a:latin typeface="Courier New"/>
-              <a:cs typeface="Courier New"/>
-            </a:endParaRPr>
           </a:p>
         </p:txBody>
       </p:sp>
@@ -12580,27 +12564,62 @@
               <a:t>.</a:t>
             </a:r>
             <a:r>
-              <a:rPr lang="en-US" dirty="0" err="1" smtClean="0">
-                <a:latin typeface="Myriad Pro"/>
-                <a:cs typeface="Myriad Pro"/>
-              </a:rPr>
-              <a:t>vaule</a:t>
-            </a:r>
-            <a:r>
-              <a:rPr lang="en-US" dirty="0" smtClean="0">
-                <a:latin typeface="Myriad Pro"/>
-                <a:cs typeface="Myriad Pro"/>
-              </a:rPr>
-              <a:t>			‘Singleton’ object/primitive</a:t>
-            </a:r>
-          </a:p>
-          <a:p>
-            <a:r>
-              <a:rPr lang="en-US" dirty="0" smtClean="0">
-                <a:latin typeface="Myriad Pro"/>
-                <a:cs typeface="Myriad Pro"/>
-              </a:rPr>
-              <a:t>.constant		Injectable to .providers</a:t>
+              <a:rPr lang="en-US" dirty="0" smtClean="0">
+                <a:latin typeface="Myriad Pro"/>
+                <a:cs typeface="Myriad Pro"/>
+              </a:rPr>
+              <a:t>value</a:t>
+            </a:r>
+            <a:r>
+              <a:rPr lang="en-US" dirty="0">
+                <a:latin typeface="Myriad Pro"/>
+                <a:cs typeface="Myriad Pro"/>
+              </a:rPr>
+              <a:t> </a:t>
+            </a:r>
+            <a:r>
+              <a:rPr lang="en-US" dirty="0" smtClean="0">
+                <a:latin typeface="Myriad Pro"/>
+                <a:cs typeface="Myriad Pro"/>
+              </a:rPr>
+              <a:t>               </a:t>
+            </a:r>
+            <a:r>
+              <a:rPr lang="en-US" dirty="0" smtClean="0">
+                <a:latin typeface="Myriad Pro"/>
+                <a:cs typeface="Myriad Pro"/>
+              </a:rPr>
+              <a:t>‘Singleton</a:t>
+            </a:r>
+            <a:r>
+              <a:rPr lang="en-US" dirty="0" smtClean="0">
+                <a:latin typeface="Myriad Pro"/>
+                <a:cs typeface="Myriad Pro"/>
+              </a:rPr>
+              <a:t>’ object/primitive</a:t>
+            </a:r>
+          </a:p>
+          <a:p>
+            <a:r>
+              <a:rPr lang="en-US" dirty="0" smtClean="0">
+                <a:latin typeface="Myriad Pro"/>
+                <a:cs typeface="Myriad Pro"/>
+              </a:rPr>
+              <a:t>.constant	</a:t>
+            </a:r>
+            <a:r>
+              <a:rPr lang="en-US" dirty="0" smtClean="0">
+                <a:latin typeface="Myriad Pro"/>
+                <a:cs typeface="Myriad Pro"/>
+              </a:rPr>
+              <a:t>         Injectable </a:t>
+            </a:r>
+            <a:r>
+              <a:rPr lang="en-US" dirty="0" smtClean="0">
+                <a:latin typeface="Myriad Pro"/>
+                <a:cs typeface="Myriad Pro"/>
+              </a:rPr>
+              <a:t>to .providers</a:t>
             </a:r>
           </a:p>
           <a:p>
@@ -12627,46 +12646,130 @@
                 <a:latin typeface="Myriad Pro"/>
                 <a:cs typeface="Myriad Pro"/>
               </a:rPr>
-              <a:t>.factory			</a:t>
-            </a:r>
-            <a:r>
-              <a:rPr lang="en-US" dirty="0" smtClean="0">
-                <a:latin typeface="Courier New"/>
-                <a:cs typeface="Courier New"/>
-              </a:rPr>
-              <a:t>return {…};</a:t>
-            </a:r>
-          </a:p>
-          <a:p>
-            <a:r>
-              <a:rPr lang="en-US" dirty="0" smtClean="0">
-                <a:latin typeface="Myriad Pro"/>
-                <a:cs typeface="Myriad Pro"/>
-              </a:rPr>
-              <a:t>.service			</a:t>
-            </a:r>
-            <a:r>
-              <a:rPr lang="en-US" dirty="0" smtClean="0">
-                <a:latin typeface="Courier New"/>
-                <a:cs typeface="Courier New"/>
-              </a:rPr>
-              <a:t>new svc();</a:t>
-            </a:r>
-          </a:p>
-          <a:p>
-            <a:r>
-              <a:rPr lang="en-US" dirty="0" smtClean="0">
-                <a:latin typeface="Myriad Pro"/>
-                <a:cs typeface="Myriad Pro"/>
-              </a:rPr>
-              <a:t>.provider			</a:t>
-            </a:r>
-            <a:r>
-              <a:rPr lang="en-US" dirty="0" smtClean="0">
-                <a:latin typeface="Courier New"/>
-                <a:cs typeface="Courier New"/>
-              </a:rPr>
-              <a:t>new pro().$get();</a:t>
+              <a:t>.</a:t>
+            </a:r>
+            <a:r>
+              <a:rPr lang="en-US" dirty="0" smtClean="0">
+                <a:latin typeface="Myriad Pro"/>
+                <a:cs typeface="Myriad Pro"/>
+              </a:rPr>
+              <a:t>factory</a:t>
+            </a:r>
+            <a:r>
+              <a:rPr lang="en-US" dirty="0">
+                <a:latin typeface="Myriad Pro"/>
+                <a:cs typeface="Myriad Pro"/>
+              </a:rPr>
+              <a:t> </a:t>
+            </a:r>
+            <a:r>
+              <a:rPr lang="en-US" dirty="0" smtClean="0">
+                <a:latin typeface="Myriad Pro"/>
+                <a:cs typeface="Myriad Pro"/>
+              </a:rPr>
+              <a:t>            </a:t>
+            </a:r>
+            <a:r>
+              <a:rPr lang="en-US" dirty="0" smtClean="0">
+                <a:latin typeface="Courier New"/>
+                <a:cs typeface="Courier New"/>
+              </a:rPr>
+              <a:t>return </a:t>
+            </a:r>
+            <a:r>
+              <a:rPr lang="en-US" dirty="0" smtClean="0">
+                <a:latin typeface="Courier New"/>
+                <a:cs typeface="Courier New"/>
+              </a:rPr>
+              <a:t>{…};</a:t>
+            </a:r>
+          </a:p>
+          <a:p>
+            <a:r>
+              <a:rPr lang="en-US" dirty="0" smtClean="0">
+                <a:latin typeface="Myriad Pro"/>
+                <a:cs typeface="Myriad Pro"/>
+              </a:rPr>
+              <a:t>.</a:t>
+            </a:r>
+            <a:r>
+              <a:rPr lang="en-US" dirty="0" smtClean="0">
+                <a:latin typeface="Myriad Pro"/>
+                <a:cs typeface="Myriad Pro"/>
+              </a:rPr>
+              <a:t>service</a:t>
+            </a:r>
+            <a:r>
+              <a:rPr lang="en-US" dirty="0">
+                <a:latin typeface="Myriad Pro"/>
+                <a:cs typeface="Myriad Pro"/>
+              </a:rPr>
+              <a:t> </a:t>
+            </a:r>
+            <a:r>
+              <a:rPr lang="en-US" dirty="0" smtClean="0">
+                <a:latin typeface="Myriad Pro"/>
+                <a:cs typeface="Myriad Pro"/>
+              </a:rPr>
+              <a:t>            </a:t>
+            </a:r>
+            <a:r>
+              <a:rPr lang="en-US" dirty="0" smtClean="0">
+                <a:latin typeface="Courier New"/>
+                <a:cs typeface="Courier New"/>
+              </a:rPr>
+              <a:t>new </a:t>
+            </a:r>
+            <a:r>
+              <a:rPr lang="en-US" dirty="0" smtClean="0">
+                <a:latin typeface="Courier New"/>
+                <a:cs typeface="Courier New"/>
+              </a:rPr>
+              <a:t>svc();</a:t>
+            </a:r>
+          </a:p>
+          <a:p>
+            <a:r>
+              <a:rPr lang="en-US" dirty="0" smtClean="0">
+                <a:latin typeface="Myriad Pro"/>
+                <a:cs typeface="Myriad Pro"/>
+              </a:rPr>
+              <a:t>.</a:t>
+            </a:r>
+            <a:r>
+              <a:rPr lang="en-US" dirty="0" smtClean="0">
+                <a:latin typeface="Myriad Pro"/>
+                <a:cs typeface="Myriad Pro"/>
+              </a:rPr>
+              <a:t>provider</a:t>
+            </a:r>
+            <a:r>
+              <a:rPr lang="en-US" dirty="0">
+                <a:latin typeface="Myriad Pro"/>
+                <a:cs typeface="Myriad Pro"/>
+              </a:rPr>
+              <a:t> </a:t>
+            </a:r>
+            <a:r>
+              <a:rPr lang="en-US" dirty="0" smtClean="0">
+                <a:latin typeface="Myriad Pro"/>
+                <a:cs typeface="Myriad Pro"/>
+              </a:rPr>
+              <a:t>         </a:t>
+            </a:r>
+            <a:r>
+              <a:rPr lang="en-US" dirty="0" smtClean="0">
+                <a:latin typeface="Courier New"/>
+                <a:cs typeface="Courier New"/>
+              </a:rPr>
+              <a:t>new </a:t>
+            </a:r>
+            <a:r>
+              <a:rPr lang="en-US" dirty="0" smtClean="0">
+                <a:latin typeface="Courier New"/>
+                <a:cs typeface="Courier New"/>
+              </a:rPr>
+              <a:t>pro().$get();</a:t>
             </a:r>
           </a:p>
           <a:p>
@@ -12693,25 +12796,109 @@
                 <a:latin typeface="Myriad Pro"/>
                 <a:cs typeface="Myriad Pro"/>
               </a:rPr>
-              <a:t>.directive		DOM element compile + link hooks. </a:t>
-            </a:r>
-          </a:p>
-          <a:p>
-            <a:r>
-              <a:rPr lang="en-US" dirty="0" smtClean="0">
-                <a:latin typeface="Myriad Pro"/>
-                <a:cs typeface="Myriad Pro"/>
-              </a:rPr>
-              <a:t>.controller	Glue between Model and View.</a:t>
-            </a:r>
-          </a:p>
-          <a:p>
-            <a:r>
-              <a:rPr lang="en-US" dirty="0" smtClean="0">
-                <a:latin typeface="Myriad Pro"/>
-                <a:cs typeface="Myriad Pro"/>
-              </a:rPr>
-              <a:t>.filter			Transformations: i18n, sorting, currency, etc.</a:t>
+              <a:t>.</a:t>
+            </a:r>
+            <a:r>
+              <a:rPr lang="en-US" dirty="0" smtClean="0">
+                <a:latin typeface="Myriad Pro"/>
+                <a:cs typeface="Myriad Pro"/>
+              </a:rPr>
+              <a:t>directive</a:t>
+            </a:r>
+            <a:r>
+              <a:rPr lang="en-US" dirty="0">
+                <a:latin typeface="Myriad Pro"/>
+                <a:cs typeface="Myriad Pro"/>
+              </a:rPr>
+              <a:t> </a:t>
+            </a:r>
+            <a:r>
+              <a:rPr lang="en-US" dirty="0" smtClean="0">
+                <a:latin typeface="Myriad Pro"/>
+                <a:cs typeface="Myriad Pro"/>
+              </a:rPr>
+              <a:t>        </a:t>
+            </a:r>
+            <a:r>
+              <a:rPr lang="en-US" dirty="0" smtClean="0">
+                <a:latin typeface="Myriad Pro"/>
+                <a:cs typeface="Myriad Pro"/>
+              </a:rPr>
+              <a:t>DOM </a:t>
+            </a:r>
+            <a:r>
+              <a:rPr lang="en-US" dirty="0" smtClean="0">
+                <a:latin typeface="Myriad Pro"/>
+                <a:cs typeface="Myriad Pro"/>
+              </a:rPr>
+              <a:t>element compile + link hooks. </a:t>
+            </a:r>
+          </a:p>
+          <a:p>
+            <a:r>
+              <a:rPr lang="en-US" dirty="0" smtClean="0">
+                <a:latin typeface="Myriad Pro"/>
+                <a:cs typeface="Myriad Pro"/>
+              </a:rPr>
+              <a:t>.</a:t>
+            </a:r>
+            <a:r>
+              <a:rPr lang="en-US" dirty="0" smtClean="0">
+                <a:latin typeface="Myriad Pro"/>
+                <a:cs typeface="Myriad Pro"/>
+              </a:rPr>
+              <a:t>controller       Glue </a:t>
+            </a:r>
+            <a:r>
+              <a:rPr lang="en-US" dirty="0" smtClean="0">
+                <a:latin typeface="Myriad Pro"/>
+                <a:cs typeface="Myriad Pro"/>
+              </a:rPr>
+              <a:t>between Model and View.</a:t>
+            </a:r>
+          </a:p>
+          <a:p>
+            <a:r>
+              <a:rPr lang="en-US" dirty="0" smtClean="0">
+                <a:latin typeface="Myriad Pro"/>
+                <a:cs typeface="Myriad Pro"/>
+              </a:rPr>
+              <a:t>.</a:t>
+            </a:r>
+            <a:r>
+              <a:rPr lang="en-US" dirty="0" smtClean="0">
+                <a:latin typeface="Myriad Pro"/>
+                <a:cs typeface="Myriad Pro"/>
+              </a:rPr>
+              <a:t>filter</a:t>
+            </a:r>
+            <a:r>
+              <a:rPr lang="en-US" dirty="0">
+                <a:latin typeface="Myriad Pro"/>
+                <a:cs typeface="Myriad Pro"/>
+              </a:rPr>
+              <a:t> </a:t>
+            </a:r>
+            <a:r>
+              <a:rPr lang="en-US" dirty="0" smtClean="0">
+                <a:latin typeface="Myriad Pro"/>
+                <a:cs typeface="Myriad Pro"/>
+              </a:rPr>
+              <a:t>                 </a:t>
+            </a:r>
+            <a:r>
+              <a:rPr lang="en-US" dirty="0" smtClean="0">
+                <a:latin typeface="Myriad Pro"/>
+                <a:cs typeface="Myriad Pro"/>
+              </a:rPr>
+              <a:t>Transformations</a:t>
+            </a:r>
+            <a:r>
+              <a:rPr lang="en-US" dirty="0" smtClean="0">
+                <a:latin typeface="Myriad Pro"/>
+                <a:cs typeface="Myriad Pro"/>
+              </a:rPr>
+              <a:t>: i18n, sorting, currency, etc.</a:t>
             </a:r>
           </a:p>
           <a:p>
@@ -12748,20 +12935,76 @@
               <a:t>config</a:t>
             </a:r>
             <a:r>
-              <a:rPr lang="en-US" dirty="0" smtClean="0">
-                <a:latin typeface="Myriad Pro"/>
-                <a:cs typeface="Myriad Pro"/>
-              </a:rPr>
-              <a:t>			“Decorate” components, declare routes.</a:t>
-            </a:r>
-          </a:p>
-          <a:p>
-            <a:r>
-              <a:rPr lang="en-US" dirty="0" smtClean="0">
-                <a:latin typeface="Myriad Pro"/>
-                <a:cs typeface="Myriad Pro"/>
-              </a:rPr>
-              <a:t>.run			Kick start application, can inject instances or constants. </a:t>
+              <a:rPr lang="en-US" dirty="0">
+                <a:latin typeface="Myriad Pro"/>
+                <a:cs typeface="Myriad Pro"/>
+              </a:rPr>
+              <a:t> </a:t>
+            </a:r>
+            <a:r>
+              <a:rPr lang="en-US" dirty="0" smtClean="0">
+                <a:latin typeface="Myriad Pro"/>
+                <a:cs typeface="Myriad Pro"/>
+              </a:rPr>
+              <a:t>             </a:t>
+            </a:r>
+            <a:r>
+              <a:rPr lang="en-US" dirty="0" smtClean="0">
+                <a:latin typeface="Myriad Pro"/>
+                <a:cs typeface="Myriad Pro"/>
+              </a:rPr>
+              <a:t>“</a:t>
+            </a:r>
+            <a:r>
+              <a:rPr lang="en-US" dirty="0" smtClean="0">
+                <a:latin typeface="Myriad Pro"/>
+                <a:cs typeface="Myriad Pro"/>
+              </a:rPr>
+              <a:t>Decorate” components, declare routes.</a:t>
+            </a:r>
+          </a:p>
+          <a:p>
+            <a:r>
+              <a:rPr lang="en-US" dirty="0" smtClean="0">
+                <a:latin typeface="Myriad Pro"/>
+                <a:cs typeface="Myriad Pro"/>
+              </a:rPr>
+              <a:t>.</a:t>
+            </a:r>
+            <a:r>
+              <a:rPr lang="en-US" dirty="0" smtClean="0">
+                <a:latin typeface="Myriad Pro"/>
+                <a:cs typeface="Myriad Pro"/>
+              </a:rPr>
+              <a:t>run</a:t>
+            </a:r>
+            <a:r>
+              <a:rPr lang="en-US" dirty="0">
+                <a:latin typeface="Myriad Pro"/>
+                <a:cs typeface="Myriad Pro"/>
+              </a:rPr>
+              <a:t> </a:t>
+            </a:r>
+            <a:r>
+              <a:rPr lang="en-US" dirty="0" smtClean="0">
+                <a:latin typeface="Myriad Pro"/>
+                <a:cs typeface="Myriad Pro"/>
+              </a:rPr>
+              <a:t>                  </a:t>
+            </a:r>
+            <a:r>
+              <a:rPr lang="en-US" dirty="0" smtClean="0">
+                <a:latin typeface="Myriad Pro"/>
+                <a:cs typeface="Myriad Pro"/>
+              </a:rPr>
+              <a:t>Kick </a:t>
+            </a:r>
+            <a:r>
+              <a:rPr lang="en-US" dirty="0" smtClean="0">
+                <a:latin typeface="Myriad Pro"/>
+                <a:cs typeface="Myriad Pro"/>
+              </a:rPr>
+              <a:t>start application, can inject instances or constants. </a:t>
             </a:r>
             <a:endParaRPr lang="en-US" dirty="0">
               <a:latin typeface="Myriad Pro"/>

</xml_diff>